<commit_message>
haar cascade face recognition
</commit_message>
<xml_diff>
--- a/ppts/facial_recognition.pptx
+++ b/ppts/facial_recognition.pptx
@@ -115,6 +115,11 @@
       </a:defRPr>
     </a:lvl9pPr>
   </p:defaultTextStyle>
+  <p:extLst>
+    <p:ext uri="{EFAFB233-063F-42B5-8137-9DF3F51BA10A}">
+      <p15:sldGuideLst xmlns:p15="http://schemas.microsoft.com/office/powerpoint/2012/main"/>
+    </p:ext>
+  </p:extLst>
 </p:presentation>
 </file>
 
@@ -3398,7 +3403,7 @@
           <a:p>
             <a:r>
               <a:rPr lang="es-AR" sz="8000" dirty="0"/>
-              <a:t>Facial recognition	</a:t>
+              <a:t>Grupo 5: Facial recognition	</a:t>
             </a:r>
           </a:p>
         </p:txBody>
@@ -3445,7 +3450,7 @@
           <a:p>
             <a:r>
               <a:rPr lang="es-AR" dirty="0"/>
-              <a:t>Joa ̃o Rosa </a:t>
+              <a:t>João Rosa </a:t>
             </a:r>
           </a:p>
           <a:p>
@@ -3554,7 +3559,7 @@
               <a:p>
                 <a:r>
                   <a:rPr lang="es-AR" dirty="0"/>
-                  <a:t>Objetivo: encontrar una representación lineal (componente) de los datos de manera que sean estadísticamente independeintes</a:t>
+                  <a:t>Objetivo: encontrar una representación (componente) de los datos de manera que sean estadísticamente independeintes</a:t>
                 </a:r>
               </a:p>
               <a:p>
@@ -3699,7 +3704,7 @@
               <a:blipFill>
                 <a:blip r:embed="rId2"/>
                 <a:stretch>
-                  <a:fillRect l="-693" r="-1040"/>
+                  <a:fillRect l="-693" r="-1386"/>
                 </a:stretch>
               </a:blipFill>
             </p:spPr>
@@ -4482,6 +4487,16 @@
             <a:r>
               <a:rPr lang="es-AR" sz="3600" dirty="0"/>
               <a:t>Generar un prototipo ya sea híbrido o median un solo método</a:t>
+            </a:r>
+          </a:p>
+          <a:p>
+            <a:pPr marL="342900" indent="-342900">
+              <a:buFont typeface="Arial" panose="020B0604020202020204" pitchFamily="34" charset="0"/>
+              <a:buChar char="•"/>
+            </a:pPr>
+            <a:r>
+              <a:rPr lang="es-AR" sz="3600" dirty="0"/>
+              <a:t>Investigar la reación y manejo de base de datos faciales</a:t>
             </a:r>
           </a:p>
           <a:p>

</xml_diff>